<commit_message>
Update DG, diagrams, PPP
</commit_message>
<xml_diff>
--- a/docs/diagrams/DeleteActivityDiagram.pptx
+++ b/docs/diagrams/DeleteActivityDiagram.pptx
@@ -261,7 +261,7 @@
           <a:p>
             <a:fld id="{E1B86536-6F0A-4213-88D9-E6D0917EE33E}" type="datetimeFigureOut">
               <a:rPr lang="en-SG" smtClean="0"/>
-              <a:t>8/11/2018</a:t>
+              <a:t>12/11/2018</a:t>
             </a:fld>
             <a:endParaRPr lang="en-SG"/>
           </a:p>
@@ -461,7 +461,7 @@
           <a:p>
             <a:fld id="{E1B86536-6F0A-4213-88D9-E6D0917EE33E}" type="datetimeFigureOut">
               <a:rPr lang="en-SG" smtClean="0"/>
-              <a:t>8/11/2018</a:t>
+              <a:t>12/11/2018</a:t>
             </a:fld>
             <a:endParaRPr lang="en-SG"/>
           </a:p>
@@ -671,7 +671,7 @@
           <a:p>
             <a:fld id="{E1B86536-6F0A-4213-88D9-E6D0917EE33E}" type="datetimeFigureOut">
               <a:rPr lang="en-SG" smtClean="0"/>
-              <a:t>8/11/2018</a:t>
+              <a:t>12/11/2018</a:t>
             </a:fld>
             <a:endParaRPr lang="en-SG"/>
           </a:p>
@@ -871,7 +871,7 @@
           <a:p>
             <a:fld id="{E1B86536-6F0A-4213-88D9-E6D0917EE33E}" type="datetimeFigureOut">
               <a:rPr lang="en-SG" smtClean="0"/>
-              <a:t>8/11/2018</a:t>
+              <a:t>12/11/2018</a:t>
             </a:fld>
             <a:endParaRPr lang="en-SG"/>
           </a:p>
@@ -1147,7 +1147,7 @@
           <a:p>
             <a:fld id="{E1B86536-6F0A-4213-88D9-E6D0917EE33E}" type="datetimeFigureOut">
               <a:rPr lang="en-SG" smtClean="0"/>
-              <a:t>8/11/2018</a:t>
+              <a:t>12/11/2018</a:t>
             </a:fld>
             <a:endParaRPr lang="en-SG"/>
           </a:p>
@@ -1415,7 +1415,7 @@
           <a:p>
             <a:fld id="{E1B86536-6F0A-4213-88D9-E6D0917EE33E}" type="datetimeFigureOut">
               <a:rPr lang="en-SG" smtClean="0"/>
-              <a:t>8/11/2018</a:t>
+              <a:t>12/11/2018</a:t>
             </a:fld>
             <a:endParaRPr lang="en-SG"/>
           </a:p>
@@ -1830,7 +1830,7 @@
           <a:p>
             <a:fld id="{E1B86536-6F0A-4213-88D9-E6D0917EE33E}" type="datetimeFigureOut">
               <a:rPr lang="en-SG" smtClean="0"/>
-              <a:t>8/11/2018</a:t>
+              <a:t>12/11/2018</a:t>
             </a:fld>
             <a:endParaRPr lang="en-SG"/>
           </a:p>
@@ -1972,7 +1972,7 @@
           <a:p>
             <a:fld id="{E1B86536-6F0A-4213-88D9-E6D0917EE33E}" type="datetimeFigureOut">
               <a:rPr lang="en-SG" smtClean="0"/>
-              <a:t>8/11/2018</a:t>
+              <a:t>12/11/2018</a:t>
             </a:fld>
             <a:endParaRPr lang="en-SG"/>
           </a:p>
@@ -2085,7 +2085,7 @@
           <a:p>
             <a:fld id="{E1B86536-6F0A-4213-88D9-E6D0917EE33E}" type="datetimeFigureOut">
               <a:rPr lang="en-SG" smtClean="0"/>
-              <a:t>8/11/2018</a:t>
+              <a:t>12/11/2018</a:t>
             </a:fld>
             <a:endParaRPr lang="en-SG"/>
           </a:p>
@@ -2398,7 +2398,7 @@
           <a:p>
             <a:fld id="{E1B86536-6F0A-4213-88D9-E6D0917EE33E}" type="datetimeFigureOut">
               <a:rPr lang="en-SG" smtClean="0"/>
-              <a:t>8/11/2018</a:t>
+              <a:t>12/11/2018</a:t>
             </a:fld>
             <a:endParaRPr lang="en-SG"/>
           </a:p>
@@ -2687,7 +2687,7 @@
           <a:p>
             <a:fld id="{E1B86536-6F0A-4213-88D9-E6D0917EE33E}" type="datetimeFigureOut">
               <a:rPr lang="en-SG" smtClean="0"/>
-              <a:t>8/11/2018</a:t>
+              <a:t>12/11/2018</a:t>
             </a:fld>
             <a:endParaRPr lang="en-SG"/>
           </a:p>
@@ -2930,7 +2930,7 @@
           <a:p>
             <a:fld id="{E1B86536-6F0A-4213-88D9-E6D0917EE33E}" type="datetimeFigureOut">
               <a:rPr lang="en-SG" smtClean="0"/>
-              <a:t>8/11/2018</a:t>
+              <a:t>12/11/2018</a:t>
             </a:fld>
             <a:endParaRPr lang="en-SG"/>
           </a:p>
@@ -3682,7 +3682,7 @@
         </p:nvCxnSpPr>
         <p:spPr>
           <a:xfrm>
-            <a:off x="7677104" y="1372944"/>
+            <a:off x="7632978" y="2714874"/>
             <a:ext cx="2694563" cy="0"/>
           </a:xfrm>
           <a:prstGeom prst="line">
@@ -3759,7 +3759,7 @@
                   <a:schemeClr val="tx1"/>
                 </a:solidFill>
               </a:rPr>
-              <a:t>Program notifies user of invalid index</a:t>
+              <a:t>UI notifies user of invalid index</a:t>
             </a:r>
           </a:p>
         </p:txBody>
@@ -4721,7 +4721,7 @@
           <a:p>
             <a:r>
               <a:rPr lang="en-SG" sz="1100" dirty="0"/>
-              <a:t>[Index Invalid]</a:t>
+              <a:t>[Invalid Index]</a:t>
             </a:r>
           </a:p>
         </p:txBody>
@@ -4740,8 +4740,8 @@
         </p:nvSpPr>
         <p:spPr>
           <a:xfrm>
-            <a:off x="8232139" y="264613"/>
-            <a:ext cx="1394461" cy="541421"/>
+            <a:off x="8232138" y="264613"/>
+            <a:ext cx="1897569" cy="541421"/>
           </a:xfrm>
           <a:prstGeom prst="roundRect">
             <a:avLst/>
@@ -4780,7 +4780,7 @@
                   <a:schemeClr val="tx1"/>
                 </a:solidFill>
               </a:rPr>
-              <a:t>Entry deleted from AddressBook</a:t>
+              <a:t>Entry removed from lists of associated entries</a:t>
             </a:r>
           </a:p>
         </p:txBody>
@@ -4799,7 +4799,7 @@
         </p:nvSpPr>
         <p:spPr>
           <a:xfrm>
-            <a:off x="7346769" y="1938197"/>
+            <a:off x="7302643" y="3280127"/>
             <a:ext cx="1665014" cy="508418"/>
           </a:xfrm>
           <a:prstGeom prst="roundRect">
@@ -4862,8 +4862,8 @@
         </p:nvCxnSpPr>
         <p:spPr>
           <a:xfrm rot="5400000" flipH="1" flipV="1">
-            <a:off x="7515245" y="142149"/>
-            <a:ext cx="323719" cy="1110070"/>
+            <a:off x="7515244" y="142150"/>
+            <a:ext cx="323719" cy="1110069"/>
           </a:xfrm>
           <a:prstGeom prst="bentConnector2">
             <a:avLst/>
@@ -4903,7 +4903,7 @@
         </p:nvCxnSpPr>
         <p:spPr>
           <a:xfrm>
-            <a:off x="8082704" y="1372944"/>
+            <a:off x="8038578" y="2714874"/>
             <a:ext cx="0" cy="566910"/>
           </a:xfrm>
           <a:prstGeom prst="straightConnector1">
@@ -4944,7 +4944,7 @@
         </p:nvCxnSpPr>
         <p:spPr>
           <a:xfrm>
-            <a:off x="9945370" y="1400464"/>
+            <a:off x="9901244" y="2742394"/>
             <a:ext cx="0" cy="566910"/>
           </a:xfrm>
           <a:prstGeom prst="straightConnector1">
@@ -4983,7 +4983,7 @@
         </p:nvSpPr>
         <p:spPr>
           <a:xfrm>
-            <a:off x="9219832" y="1957853"/>
+            <a:off x="9175706" y="3299783"/>
             <a:ext cx="1306749" cy="508418"/>
           </a:xfrm>
           <a:prstGeom prst="roundRect">
@@ -5044,7 +5044,7 @@
         </p:nvCxnSpPr>
         <p:spPr>
           <a:xfrm>
-            <a:off x="8091170" y="2446615"/>
+            <a:off x="8047044" y="3788545"/>
             <a:ext cx="0" cy="566910"/>
           </a:xfrm>
           <a:prstGeom prst="straightConnector1">
@@ -5085,7 +5085,7 @@
         </p:nvCxnSpPr>
         <p:spPr>
           <a:xfrm>
-            <a:off x="9953837" y="2466271"/>
+            <a:off x="9909711" y="3808201"/>
             <a:ext cx="0" cy="566910"/>
           </a:xfrm>
           <a:prstGeom prst="straightConnector1">
@@ -5126,7 +5126,7 @@
         </p:nvCxnSpPr>
         <p:spPr>
           <a:xfrm>
-            <a:off x="7664501" y="3013525"/>
+            <a:off x="7620375" y="4355455"/>
             <a:ext cx="2694563" cy="0"/>
           </a:xfrm>
           <a:prstGeom prst="line">
@@ -5166,12 +5166,12 @@
         </p:nvCxnSpPr>
         <p:spPr>
           <a:xfrm rot="10800000" flipV="1">
-            <a:off x="1133655" y="2997200"/>
-            <a:ext cx="7878129" cy="2544508"/>
+            <a:off x="1133654" y="4329948"/>
+            <a:ext cx="7972246" cy="1211760"/>
           </a:xfrm>
           <a:prstGeom prst="bentConnector3">
             <a:avLst>
-              <a:gd name="adj1" fmla="val -175"/>
+              <a:gd name="adj1" fmla="val 417"/>
             </a:avLst>
           </a:prstGeom>
           <a:ln>
@@ -5209,8 +5209,108 @@
         </p:nvCxnSpPr>
         <p:spPr>
           <a:xfrm>
-            <a:off x="8967657" y="815559"/>
+            <a:off x="9175706" y="818779"/>
             <a:ext cx="0" cy="566910"/>
+          </a:xfrm>
+          <a:prstGeom prst="straightConnector1">
+            <a:avLst/>
+          </a:prstGeom>
+          <a:ln>
+            <a:tailEnd type="triangle"/>
+          </a:ln>
+        </p:spPr>
+        <p:style>
+          <a:lnRef idx="1">
+            <a:schemeClr val="dk1"/>
+          </a:lnRef>
+          <a:fillRef idx="0">
+            <a:schemeClr val="dk1"/>
+          </a:fillRef>
+          <a:effectRef idx="0">
+            <a:schemeClr val="dk1"/>
+          </a:effectRef>
+          <a:fontRef idx="minor">
+            <a:schemeClr val="tx1"/>
+          </a:fontRef>
+        </p:style>
+      </p:cxnSp>
+      <p:sp>
+        <p:nvSpPr>
+          <p:cNvPr id="52" name="Rectangle: Rounded Corners 51">
+            <a:extLst>
+              <a:ext uri="{FF2B5EF4-FFF2-40B4-BE49-F238E27FC236}">
+                <a16:creationId xmlns:a16="http://schemas.microsoft.com/office/drawing/2014/main" id="{1F70D7BA-208C-4E35-8536-EAA534400790}"/>
+              </a:ext>
+            </a:extLst>
+          </p:cNvPr>
+          <p:cNvSpPr/>
+          <p:nvPr/>
+        </p:nvSpPr>
+        <p:spPr>
+          <a:xfrm>
+            <a:off x="8232138" y="1371286"/>
+            <a:ext cx="1897569" cy="541421"/>
+          </a:xfrm>
+          <a:prstGeom prst="roundRect">
+            <a:avLst/>
+          </a:prstGeom>
+          <a:noFill/>
+          <a:ln>
+            <a:solidFill>
+              <a:schemeClr val="tx1"/>
+            </a:solidFill>
+          </a:ln>
+        </p:spPr>
+        <p:style>
+          <a:lnRef idx="2">
+            <a:schemeClr val="accent1">
+              <a:shade val="50000"/>
+            </a:schemeClr>
+          </a:lnRef>
+          <a:fillRef idx="1">
+            <a:schemeClr val="accent1"/>
+          </a:fillRef>
+          <a:effectRef idx="0">
+            <a:schemeClr val="accent1"/>
+          </a:effectRef>
+          <a:fontRef idx="minor">
+            <a:schemeClr val="lt1"/>
+          </a:fontRef>
+        </p:style>
+        <p:txBody>
+          <a:bodyPr rtlCol="0" anchor="ctr"/>
+          <a:lstStyle/>
+          <a:p>
+            <a:pPr algn="ctr"/>
+            <a:r>
+              <a:rPr lang="en-SG" sz="1200" dirty="0">
+                <a:solidFill>
+                  <a:schemeClr val="tx1"/>
+                </a:solidFill>
+              </a:rPr>
+              <a:t>Entry deleted from AddressBook</a:t>
+            </a:r>
+          </a:p>
+        </p:txBody>
+      </p:sp>
+      <p:cxnSp>
+        <p:nvCxnSpPr>
+          <p:cNvPr id="53" name="Straight Arrow Connector 52">
+            <a:extLst>
+              <a:ext uri="{FF2B5EF4-FFF2-40B4-BE49-F238E27FC236}">
+                <a16:creationId xmlns:a16="http://schemas.microsoft.com/office/drawing/2014/main" id="{6E20EED1-FA20-4EEC-88BC-8EFE9F33C539}"/>
+              </a:ext>
+            </a:extLst>
+          </p:cNvPr>
+          <p:cNvCxnSpPr>
+            <a:cxnSpLocks/>
+          </p:cNvCxnSpPr>
+          <p:nvPr/>
+        </p:nvCxnSpPr>
+        <p:spPr>
+          <a:xfrm>
+            <a:off x="9197887" y="1919689"/>
+            <a:ext cx="0" cy="795185"/>
           </a:xfrm>
           <a:prstGeom prst="straightConnector1">
             <a:avLst/>

</xml_diff>